<commit_message>
Refactored introduction and topics
</commit_message>
<xml_diff>
--- a/Chatbot overview.pptx
+++ b/Chatbot overview.pptx
@@ -4131,7 +4131,7 @@
           <a:p>
             <a:fld id="{11123780-0C4F-48C7-B1B4-A24DB6558389}" type="datetimeFigureOut">
               <a:rPr lang="en-US" smtClean="0"/>
-              <a:t>7/4/2020</a:t>
+              <a:t>08-Jul-20</a:t>
             </a:fld>
             <a:endParaRPr lang="en-US"/>
           </a:p>
@@ -4329,7 +4329,7 @@
           <a:p>
             <a:fld id="{11123780-0C4F-48C7-B1B4-A24DB6558389}" type="datetimeFigureOut">
               <a:rPr lang="en-US" smtClean="0"/>
-              <a:t>7/4/2020</a:t>
+              <a:t>08-Jul-20</a:t>
             </a:fld>
             <a:endParaRPr lang="en-US"/>
           </a:p>
@@ -4537,7 +4537,7 @@
           <a:p>
             <a:fld id="{11123780-0C4F-48C7-B1B4-A24DB6558389}" type="datetimeFigureOut">
               <a:rPr lang="en-US" smtClean="0"/>
-              <a:t>7/4/2020</a:t>
+              <a:t>08-Jul-20</a:t>
             </a:fld>
             <a:endParaRPr lang="en-US"/>
           </a:p>
@@ -4735,7 +4735,7 @@
           <a:p>
             <a:fld id="{11123780-0C4F-48C7-B1B4-A24DB6558389}" type="datetimeFigureOut">
               <a:rPr lang="en-US" smtClean="0"/>
-              <a:t>7/4/2020</a:t>
+              <a:t>08-Jul-20</a:t>
             </a:fld>
             <a:endParaRPr lang="en-US"/>
           </a:p>
@@ -5010,7 +5010,7 @@
           <a:p>
             <a:fld id="{11123780-0C4F-48C7-B1B4-A24DB6558389}" type="datetimeFigureOut">
               <a:rPr lang="en-US" smtClean="0"/>
-              <a:t>7/4/2020</a:t>
+              <a:t>08-Jul-20</a:t>
             </a:fld>
             <a:endParaRPr lang="en-US"/>
           </a:p>
@@ -5275,7 +5275,7 @@
           <a:p>
             <a:fld id="{11123780-0C4F-48C7-B1B4-A24DB6558389}" type="datetimeFigureOut">
               <a:rPr lang="en-US" smtClean="0"/>
-              <a:t>7/4/2020</a:t>
+              <a:t>08-Jul-20</a:t>
             </a:fld>
             <a:endParaRPr lang="en-US"/>
           </a:p>
@@ -5687,7 +5687,7 @@
           <a:p>
             <a:fld id="{11123780-0C4F-48C7-B1B4-A24DB6558389}" type="datetimeFigureOut">
               <a:rPr lang="en-US" smtClean="0"/>
-              <a:t>7/4/2020</a:t>
+              <a:t>08-Jul-20</a:t>
             </a:fld>
             <a:endParaRPr lang="en-US"/>
           </a:p>
@@ -5828,7 +5828,7 @@
           <a:p>
             <a:fld id="{11123780-0C4F-48C7-B1B4-A24DB6558389}" type="datetimeFigureOut">
               <a:rPr lang="en-US" smtClean="0"/>
-              <a:t>7/4/2020</a:t>
+              <a:t>08-Jul-20</a:t>
             </a:fld>
             <a:endParaRPr lang="en-US"/>
           </a:p>
@@ -5941,7 +5941,7 @@
           <a:p>
             <a:fld id="{11123780-0C4F-48C7-B1B4-A24DB6558389}" type="datetimeFigureOut">
               <a:rPr lang="en-US" smtClean="0"/>
-              <a:t>7/4/2020</a:t>
+              <a:t>08-Jul-20</a:t>
             </a:fld>
             <a:endParaRPr lang="en-US"/>
           </a:p>
@@ -6252,7 +6252,7 @@
           <a:p>
             <a:fld id="{11123780-0C4F-48C7-B1B4-A24DB6558389}" type="datetimeFigureOut">
               <a:rPr lang="en-US" smtClean="0"/>
-              <a:t>7/4/2020</a:t>
+              <a:t>08-Jul-20</a:t>
             </a:fld>
             <a:endParaRPr lang="en-US"/>
           </a:p>
@@ -6540,7 +6540,7 @@
           <a:p>
             <a:fld id="{11123780-0C4F-48C7-B1B4-A24DB6558389}" type="datetimeFigureOut">
               <a:rPr lang="en-US" smtClean="0"/>
-              <a:t>7/4/2020</a:t>
+              <a:t>08-Jul-20</a:t>
             </a:fld>
             <a:endParaRPr lang="en-US"/>
           </a:p>
@@ -6781,7 +6781,7 @@
           <a:p>
             <a:fld id="{11123780-0C4F-48C7-B1B4-A24DB6558389}" type="datetimeFigureOut">
               <a:rPr lang="en-US" smtClean="0"/>
-              <a:t>7/4/2020</a:t>
+              <a:t>08-Jul-20</a:t>
             </a:fld>
             <a:endParaRPr lang="en-US"/>
           </a:p>

</xml_diff>